<commit_message>
Corrected a small thing on a slide
</commit_message>
<xml_diff>
--- a/craig_slides.pptx
+++ b/craig_slides.pptx
@@ -118,7 +118,7 @@
   <pc:docChgLst>
     <pc:chgData name="Craig Gallagher" userId="28cd9cc4fde23f80" providerId="LiveId" clId="{8D5E68E8-7DA0-4E45-B594-BBE4F9FACBA1}"/>
     <pc:docChg chg="undo custSel addSld delSld modSld">
-      <pc:chgData name="Craig Gallagher" userId="28cd9cc4fde23f80" providerId="LiveId" clId="{8D5E68E8-7DA0-4E45-B594-BBE4F9FACBA1}" dt="2023-05-03T00:56:22.919" v="1678" actId="20577"/>
+      <pc:chgData name="Craig Gallagher" userId="28cd9cc4fde23f80" providerId="LiveId" clId="{8D5E68E8-7DA0-4E45-B594-BBE4F9FACBA1}" dt="2023-05-03T01:00:14.016" v="1679" actId="20577"/>
       <pc:docMkLst>
         <pc:docMk/>
       </pc:docMkLst>
@@ -179,7 +179,7 @@
         </pc:sldMkLst>
       </pc:sldChg>
       <pc:sldChg chg="addSp modSp add mod">
-        <pc:chgData name="Craig Gallagher" userId="28cd9cc4fde23f80" providerId="LiveId" clId="{8D5E68E8-7DA0-4E45-B594-BBE4F9FACBA1}" dt="2023-05-03T00:43:23.399" v="1412" actId="14100"/>
+        <pc:chgData name="Craig Gallagher" userId="28cd9cc4fde23f80" providerId="LiveId" clId="{8D5E68E8-7DA0-4E45-B594-BBE4F9FACBA1}" dt="2023-05-03T01:00:14.016" v="1679" actId="20577"/>
         <pc:sldMkLst>
           <pc:docMk/>
           <pc:sldMk cId="347274745" sldId="266"/>
@@ -193,7 +193,7 @@
           </ac:spMkLst>
         </pc:spChg>
         <pc:spChg chg="mod">
-          <ac:chgData name="Craig Gallagher" userId="28cd9cc4fde23f80" providerId="LiveId" clId="{8D5E68E8-7DA0-4E45-B594-BBE4F9FACBA1}" dt="2023-05-03T00:28:08.885" v="1311" actId="27636"/>
+          <ac:chgData name="Craig Gallagher" userId="28cd9cc4fde23f80" providerId="LiveId" clId="{8D5E68E8-7DA0-4E45-B594-BBE4F9FACBA1}" dt="2023-05-03T01:00:14.016" v="1679" actId="20577"/>
           <ac:spMkLst>
             <pc:docMk/>
             <pc:sldMk cId="347274745" sldId="266"/>
@@ -4251,7 +4251,7 @@
           <a:p>
             <a:r>
               <a:rPr lang="en-US" sz="2200" dirty="0"/>
-              <a:t>Years with data ranged 44 years from 1975 to 2022, for exactly 13,000 unique Zip Codes.</a:t>
+              <a:t>Years with data ranged 48 years from 1975 to 2022, for exactly 13,000 unique Zip Codes.</a:t>
             </a:r>
           </a:p>
           <a:p>

</xml_diff>

<commit_message>
Changed slide after bug fix changed results values
</commit_message>
<xml_diff>
--- a/craig_slides.pptx
+++ b/craig_slides.pptx
@@ -118,7 +118,7 @@
   <pc:docChgLst>
     <pc:chgData name="Craig Gallagher" userId="28cd9cc4fde23f80" providerId="LiveId" clId="{8D5E68E8-7DA0-4E45-B594-BBE4F9FACBA1}"/>
     <pc:docChg chg="undo custSel addSld delSld modSld">
-      <pc:chgData name="Craig Gallagher" userId="28cd9cc4fde23f80" providerId="LiveId" clId="{8D5E68E8-7DA0-4E45-B594-BBE4F9FACBA1}" dt="2023-05-03T01:00:14.016" v="1679" actId="20577"/>
+      <pc:chgData name="Craig Gallagher" userId="28cd9cc4fde23f80" providerId="LiveId" clId="{8D5E68E8-7DA0-4E45-B594-BBE4F9FACBA1}" dt="2023-05-03T01:47:41.492" v="1944" actId="20577"/>
       <pc:docMkLst>
         <pc:docMk/>
       </pc:docMkLst>
@@ -225,13 +225,13 @@
         </pc:sldMkLst>
       </pc:sldChg>
       <pc:sldChg chg="modSp add mod">
-        <pc:chgData name="Craig Gallagher" userId="28cd9cc4fde23f80" providerId="LiveId" clId="{8D5E68E8-7DA0-4E45-B594-BBE4F9FACBA1}" dt="2023-05-03T00:56:22.919" v="1678" actId="20577"/>
+        <pc:chgData name="Craig Gallagher" userId="28cd9cc4fde23f80" providerId="LiveId" clId="{8D5E68E8-7DA0-4E45-B594-BBE4F9FACBA1}" dt="2023-05-03T01:47:41.492" v="1944" actId="20577"/>
         <pc:sldMkLst>
           <pc:docMk/>
           <pc:sldMk cId="282584994" sldId="267"/>
         </pc:sldMkLst>
         <pc:spChg chg="mod">
-          <ac:chgData name="Craig Gallagher" userId="28cd9cc4fde23f80" providerId="LiveId" clId="{8D5E68E8-7DA0-4E45-B594-BBE4F9FACBA1}" dt="2023-05-03T00:56:22.919" v="1678" actId="20577"/>
+          <ac:chgData name="Craig Gallagher" userId="28cd9cc4fde23f80" providerId="LiveId" clId="{8D5E68E8-7DA0-4E45-B594-BBE4F9FACBA1}" dt="2023-05-03T01:47:41.492" v="1944" actId="20577"/>
           <ac:spMkLst>
             <pc:docMk/>
             <pc:sldMk cId="282584994" sldId="267"/>
@@ -5174,7 +5174,7 @@
           <a:p>
             <a:r>
               <a:rPr lang="en-US" sz="2200" dirty="0"/>
-              <a:t>Change in HPI was computed for periods of 3, 5, 10, and 20 years, as well as the full 44 years, and outliers were determined for each period.  There were ### outliers for the longest period, ### for the shortest.</a:t>
+              <a:t>Change in HPI was computed for periods of 3, 5, 10, and 20 years, as well as the full 48 years, and outliers were determined for each period.  There were 126 outliers for the 20-year period, 273 for the 3-year period.  The full 48-year period had no outliers.</a:t>
             </a:r>
           </a:p>
           <a:p>
@@ -5214,6 +5214,12 @@
             <a:r>
               <a:rPr lang="en-US" sz="2200" dirty="0"/>
               <a:t>Multiple .csv files were used to store the results, but it would be possible to use a single file, so a future improvement would be to update this analysis code to do that, which would require altering the code for later analysis that accesses those files.</a:t>
+            </a:r>
+          </a:p>
+          <a:p>
+            <a:r>
+              <a:rPr lang="en-US" sz="2200" dirty="0"/>
+              <a:t>Add consideration into the code for periods with no mathematically outliers – perhaps top and bottom 5 zip codes.</a:t>
             </a:r>
           </a:p>
           <a:p>

</xml_diff>